<commit_message>
[ADD] Stacked bar plots
</commit_message>
<xml_diff>
--- a/SOFTWARE_QUALITY_EVALUATION.pptx
+++ b/SOFTWARE_QUALITY_EVALUATION.pptx
@@ -6,7 +6,7 @@
     <p:sldMasterId id="2147483660" r:id="rId2"/>
   </p:sldMasterIdLst>
   <p:notesMasterIdLst>
-    <p:notesMasterId r:id="rId22"/>
+    <p:notesMasterId r:id="rId24"/>
   </p:notesMasterIdLst>
   <p:sldIdLst>
     <p:sldId id="258" r:id="rId3"/>
@@ -19,15 +19,17 @@
     <p:sldId id="263" r:id="rId10"/>
     <p:sldId id="264" r:id="rId11"/>
     <p:sldId id="265" r:id="rId12"/>
-    <p:sldId id="266" r:id="rId13"/>
-    <p:sldId id="267" r:id="rId14"/>
-    <p:sldId id="268" r:id="rId15"/>
-    <p:sldId id="269" r:id="rId16"/>
-    <p:sldId id="270" r:id="rId17"/>
-    <p:sldId id="271" r:id="rId18"/>
-    <p:sldId id="272" r:id="rId19"/>
-    <p:sldId id="273" r:id="rId20"/>
-    <p:sldId id="274" r:id="rId21"/>
+    <p:sldId id="276" r:id="rId13"/>
+    <p:sldId id="266" r:id="rId14"/>
+    <p:sldId id="267" r:id="rId15"/>
+    <p:sldId id="268" r:id="rId16"/>
+    <p:sldId id="269" r:id="rId17"/>
+    <p:sldId id="275" r:id="rId18"/>
+    <p:sldId id="270" r:id="rId19"/>
+    <p:sldId id="271" r:id="rId20"/>
+    <p:sldId id="272" r:id="rId21"/>
+    <p:sldId id="273" r:id="rId22"/>
+    <p:sldId id="274" r:id="rId23"/>
   </p:sldIdLst>
   <p:sldSz cx="12192000" cy="6858000"/>
   <p:notesSz cx="6858000" cy="9144000"/>
@@ -216,7 +218,7 @@
           <a:p>
             <a:fld id="{A5C20BB3-3CCB-4FE5-991B-82F6BCB48AF3}" type="datetimeFigureOut">
               <a:rPr lang="en-US" smtClean="0"/>
-              <a:t>2/2/2021</a:t>
+              <a:t>2/3/2021</a:t>
             </a:fld>
             <a:endParaRPr lang="en-US"/>
           </a:p>
@@ -819,7 +821,7 @@
             <a:fld id="{B61BEF0D-F0BB-DE4B-95CE-6DB70DBA9567}" type="datetimeFigureOut">
               <a:rPr lang="en-US" dirty="0"/>
               <a:pPr/>
-              <a:t>2/2/2021</a:t>
+              <a:t>2/3/2021</a:t>
             </a:fld>
             <a:endParaRPr lang="en-US" dirty="0"/>
           </a:p>
@@ -1083,7 +1085,7 @@
             <a:fld id="{B61BEF0D-F0BB-DE4B-95CE-6DB70DBA9567}" type="datetimeFigureOut">
               <a:rPr lang="en-US" dirty="0"/>
               <a:pPr/>
-              <a:t>2/2/2021</a:t>
+              <a:t>2/3/2021</a:t>
             </a:fld>
             <a:endParaRPr lang="en-US" dirty="0"/>
           </a:p>
@@ -1320,7 +1322,7 @@
             <a:fld id="{B61BEF0D-F0BB-DE4B-95CE-6DB70DBA9567}" type="datetimeFigureOut">
               <a:rPr lang="en-US" dirty="0"/>
               <a:pPr/>
-              <a:t>2/2/2021</a:t>
+              <a:t>2/3/2021</a:t>
             </a:fld>
             <a:endParaRPr lang="en-US" dirty="0"/>
           </a:p>
@@ -1578,7 +1580,7 @@
           <a:p>
             <a:fld id="{3652CD92-9D15-43B4-8516-073FCDAC90D4}" type="datetimeFigureOut">
               <a:rPr lang="en-US" smtClean="0"/>
-              <a:t>2/2/2021</a:t>
+              <a:t>2/3/2021</a:t>
             </a:fld>
             <a:endParaRPr lang="en-US"/>
           </a:p>
@@ -1835,7 +1837,7 @@
             <a:fld id="{B61BEF0D-F0BB-DE4B-95CE-6DB70DBA9567}" type="datetimeFigureOut">
               <a:rPr lang="en-US" dirty="0"/>
               <a:pPr/>
-              <a:t>2/2/2021</a:t>
+              <a:t>2/3/2021</a:t>
             </a:fld>
             <a:endParaRPr lang="en-US" dirty="0"/>
           </a:p>
@@ -2144,7 +2146,7 @@
             <a:fld id="{B61BEF0D-F0BB-DE4B-95CE-6DB70DBA9567}" type="datetimeFigureOut">
               <a:rPr lang="en-US" dirty="0"/>
               <a:pPr/>
-              <a:t>2/2/2021</a:t>
+              <a:t>2/3/2021</a:t>
             </a:fld>
             <a:endParaRPr lang="en-US" dirty="0"/>
           </a:p>
@@ -2448,7 +2450,7 @@
             <a:fld id="{B61BEF0D-F0BB-DE4B-95CE-6DB70DBA9567}" type="datetimeFigureOut">
               <a:rPr lang="en-US" dirty="0"/>
               <a:pPr/>
-              <a:t>2/2/2021</a:t>
+              <a:t>2/3/2021</a:t>
             </a:fld>
             <a:endParaRPr lang="en-US" dirty="0"/>
           </a:p>
@@ -2872,7 +2874,7 @@
             <a:fld id="{B61BEF0D-F0BB-DE4B-95CE-6DB70DBA9567}" type="datetimeFigureOut">
               <a:rPr lang="en-US" dirty="0"/>
               <a:pPr/>
-              <a:t>2/2/2021</a:t>
+              <a:t>2/3/2021</a:t>
             </a:fld>
             <a:endParaRPr lang="en-US" dirty="0"/>
           </a:p>
@@ -3036,7 +3038,7 @@
             <a:fld id="{B61BEF0D-F0BB-DE4B-95CE-6DB70DBA9567}" type="datetimeFigureOut">
               <a:rPr lang="en-US" dirty="0"/>
               <a:pPr/>
-              <a:t>2/2/2021</a:t>
+              <a:t>2/3/2021</a:t>
             </a:fld>
             <a:endParaRPr lang="en-US" dirty="0"/>
           </a:p>
@@ -3133,7 +3135,7 @@
             <a:fld id="{B61BEF0D-F0BB-DE4B-95CE-6DB70DBA9567}" type="datetimeFigureOut">
               <a:rPr lang="en-US" dirty="0"/>
               <a:pPr/>
-              <a:t>2/2/2021</a:t>
+              <a:t>2/3/2021</a:t>
             </a:fld>
             <a:endParaRPr lang="en-US" dirty="0"/>
           </a:p>
@@ -3513,7 +3515,7 @@
             <a:fld id="{B61BEF0D-F0BB-DE4B-95CE-6DB70DBA9567}" type="datetimeFigureOut">
               <a:rPr lang="en-US" dirty="0"/>
               <a:pPr/>
-              <a:t>2/2/2021</a:t>
+              <a:t>2/3/2021</a:t>
             </a:fld>
             <a:endParaRPr lang="en-US" dirty="0"/>
           </a:p>
@@ -3804,7 +3806,7 @@
             <a:fld id="{B61BEF0D-F0BB-DE4B-95CE-6DB70DBA9567}" type="datetimeFigureOut">
               <a:rPr lang="en-US" dirty="0"/>
               <a:pPr/>
-              <a:t>2/2/2021</a:t>
+              <a:t>2/3/2021</a:t>
             </a:fld>
             <a:endParaRPr lang="en-US" dirty="0"/>
           </a:p>
@@ -4017,7 +4019,7 @@
             <a:fld id="{B61BEF0D-F0BB-DE4B-95CE-6DB70DBA9567}" type="datetimeFigureOut">
               <a:rPr lang="en-US" dirty="0"/>
               <a:pPr/>
-              <a:t>2/2/2021</a:t>
+              <a:t>2/3/2021</a:t>
             </a:fld>
             <a:endParaRPr lang="en-US" dirty="0"/>
           </a:p>
@@ -4752,7 +4754,7 @@
           <a:p>
             <a:fld id="{3652CD92-9D15-43B4-8516-073FCDAC90D4}" type="datetimeFigureOut">
               <a:rPr lang="en-US" smtClean="0"/>
-              <a:t>2/2/2021</a:t>
+              <a:t>2/3/2021</a:t>
             </a:fld>
             <a:endParaRPr lang="en-US"/>
           </a:p>
@@ -5471,31 +5473,6 @@
           </a:p>
         </p:txBody>
       </p:sp>
-      <p:sp>
-        <p:nvSpPr>
-          <p:cNvPr id="3" name="Content Placeholder 2">
-            <a:extLst>
-              <a:ext uri="{FF2B5EF4-FFF2-40B4-BE49-F238E27FC236}">
-                <a16:creationId xmlns:a16="http://schemas.microsoft.com/office/drawing/2014/main" id="{5AF3FD19-B0F5-4C03-9695-67E9BE69A768}"/>
-              </a:ext>
-            </a:extLst>
-          </p:cNvPr>
-          <p:cNvSpPr>
-            <a:spLocks noGrp="1"/>
-          </p:cNvSpPr>
-          <p:nvPr>
-            <p:ph idx="1"/>
-          </p:nvPr>
-        </p:nvSpPr>
-        <p:spPr/>
-        <p:txBody>
-          <a:bodyPr/>
-          <a:lstStyle/>
-          <a:p>
-            <a:endParaRPr lang="en-GB" dirty="0"/>
-          </a:p>
-        </p:txBody>
-      </p:sp>
       <p:pic>
         <p:nvPicPr>
           <p:cNvPr id="4" name="Picture 3">
@@ -5518,8 +5495,8 @@
         </p:blipFill>
         <p:spPr>
           <a:xfrm>
-            <a:off x="1481609" y="2262672"/>
-            <a:ext cx="5162550" cy="3381375"/>
+            <a:off x="758127" y="1559287"/>
+            <a:ext cx="7009248" cy="4590928"/>
           </a:xfrm>
           <a:prstGeom prst="rect">
             <a:avLst/>
@@ -5561,7 +5538,7 @@
           <p:cNvPr id="2" name="Title 1">
             <a:extLst>
               <a:ext uri="{FF2B5EF4-FFF2-40B4-BE49-F238E27FC236}">
-                <a16:creationId xmlns:a16="http://schemas.microsoft.com/office/drawing/2014/main" id="{A73914FA-6821-4D81-9B69-DE87243E81CF}"/>
+                <a16:creationId xmlns:a16="http://schemas.microsoft.com/office/drawing/2014/main" id="{A914D70F-1C33-4E65-B592-2BF8ED113377}"/>
               </a:ext>
             </a:extLst>
           </p:cNvPr>
@@ -5578,10 +5555,9 @@
           <a:lstStyle/>
           <a:p>
             <a:r>
-              <a:rPr lang="en-GB" dirty="0" err="1"/>
-              <a:t>KMeans</a:t>
-            </a:r>
-            <a:endParaRPr lang="en-GB" dirty="0"/>
+              <a:rPr lang="en-GB" dirty="0"/>
+              <a:t>Stacked bar plots</a:t>
+            </a:r>
           </a:p>
         </p:txBody>
       </p:sp>
@@ -5590,7 +5566,7 @@
           <p:cNvPr id="5" name="Picture 4">
             <a:extLst>
               <a:ext uri="{FF2B5EF4-FFF2-40B4-BE49-F238E27FC236}">
-                <a16:creationId xmlns:a16="http://schemas.microsoft.com/office/drawing/2014/main" id="{F3C357F5-5AAE-40FF-AC8D-4591A4B76301}"/>
+                <a16:creationId xmlns:a16="http://schemas.microsoft.com/office/drawing/2014/main" id="{7B58A9A4-80EF-4651-9A84-C1CFEEBE5BEB}"/>
               </a:ext>
             </a:extLst>
           </p:cNvPr>
@@ -5607,8 +5583,8 @@
         </p:blipFill>
         <p:spPr>
           <a:xfrm>
-            <a:off x="100483" y="1543432"/>
-            <a:ext cx="7278468" cy="2985146"/>
+            <a:off x="7547177" y="2151292"/>
+            <a:ext cx="4509737" cy="4005668"/>
           </a:xfrm>
           <a:prstGeom prst="rect">
             <a:avLst/>
@@ -5620,7 +5596,7 @@
           <p:cNvPr id="7" name="Picture 6">
             <a:extLst>
               <a:ext uri="{FF2B5EF4-FFF2-40B4-BE49-F238E27FC236}">
-                <a16:creationId xmlns:a16="http://schemas.microsoft.com/office/drawing/2014/main" id="{93ED9A22-FD1A-4D1C-8AEC-66FCEA5090B0}"/>
+                <a16:creationId xmlns:a16="http://schemas.microsoft.com/office/drawing/2014/main" id="{19D59478-0CB6-4DE7-8B91-2F125FA42CF3}"/>
               </a:ext>
             </a:extLst>
           </p:cNvPr>
@@ -5637,8 +5613,8 @@
         </p:blipFill>
         <p:spPr>
           <a:xfrm>
-            <a:off x="6501284" y="2661611"/>
-            <a:ext cx="5590233" cy="3733934"/>
+            <a:off x="0" y="1449606"/>
+            <a:ext cx="7980218" cy="5408394"/>
           </a:xfrm>
           <a:prstGeom prst="rect">
             <a:avLst/>
@@ -5648,7 +5624,7 @@
     </p:spTree>
     <p:extLst>
       <p:ext uri="{BB962C8B-B14F-4D97-AF65-F5344CB8AC3E}">
-        <p14:creationId xmlns:p14="http://schemas.microsoft.com/office/powerpoint/2010/main" val="344645447"/>
+        <p14:creationId xmlns:p14="http://schemas.microsoft.com/office/powerpoint/2010/main" val="2780080654"/>
       </p:ext>
     </p:extLst>
   </p:cSld>
@@ -5680,7 +5656,7 @@
           <p:cNvPr id="2" name="Title 1">
             <a:extLst>
               <a:ext uri="{FF2B5EF4-FFF2-40B4-BE49-F238E27FC236}">
-                <a16:creationId xmlns:a16="http://schemas.microsoft.com/office/drawing/2014/main" id="{E340521C-F093-4D3C-AE72-24977A59CF76}"/>
+                <a16:creationId xmlns:a16="http://schemas.microsoft.com/office/drawing/2014/main" id="{A73914FA-6821-4D81-9B69-DE87243E81CF}"/>
               </a:ext>
             </a:extLst>
           </p:cNvPr>
@@ -5693,14 +5669,12 @@
         </p:nvSpPr>
         <p:spPr/>
         <p:txBody>
-          <a:bodyPr>
-            <a:normAutofit/>
-          </a:bodyPr>
+          <a:bodyPr/>
           <a:lstStyle/>
           <a:p>
             <a:r>
-              <a:rPr lang="en-GB" b="1" dirty="0"/>
-              <a:t>Linear Regression</a:t>
+              <a:rPr lang="en-GB" dirty="0" err="1"/>
+              <a:t>KMeans</a:t>
             </a:r>
             <a:endParaRPr lang="en-GB" dirty="0"/>
           </a:p>
@@ -5711,7 +5685,7 @@
           <p:cNvPr id="5" name="Picture 4">
             <a:extLst>
               <a:ext uri="{FF2B5EF4-FFF2-40B4-BE49-F238E27FC236}">
-                <a16:creationId xmlns:a16="http://schemas.microsoft.com/office/drawing/2014/main" id="{DB92D366-EDE5-4ADA-8F0F-C65A0FFA74F2}"/>
+                <a16:creationId xmlns:a16="http://schemas.microsoft.com/office/drawing/2014/main" id="{F3C357F5-5AAE-40FF-AC8D-4591A4B76301}"/>
               </a:ext>
             </a:extLst>
           </p:cNvPr>
@@ -5728,8 +5702,8 @@
         </p:blipFill>
         <p:spPr>
           <a:xfrm>
-            <a:off x="7593827" y="1284718"/>
-            <a:ext cx="4531766" cy="3166702"/>
+            <a:off x="100483" y="1543432"/>
+            <a:ext cx="7278468" cy="2985146"/>
           </a:xfrm>
           <a:prstGeom prst="rect">
             <a:avLst/>
@@ -5738,10 +5712,10 @@
       </p:pic>
       <p:pic>
         <p:nvPicPr>
-          <p:cNvPr id="9" name="Picture 8">
+          <p:cNvPr id="7" name="Picture 6">
             <a:extLst>
               <a:ext uri="{FF2B5EF4-FFF2-40B4-BE49-F238E27FC236}">
-                <a16:creationId xmlns:a16="http://schemas.microsoft.com/office/drawing/2014/main" id="{C32A8E7C-CE4D-4701-A54A-CB9E17E740E2}"/>
+                <a16:creationId xmlns:a16="http://schemas.microsoft.com/office/drawing/2014/main" id="{93ED9A22-FD1A-4D1C-8AEC-66FCEA5090B0}"/>
               </a:ext>
             </a:extLst>
           </p:cNvPr>
@@ -5758,38 +5732,8 @@
         </p:blipFill>
         <p:spPr>
           <a:xfrm>
-            <a:off x="0" y="1459653"/>
-            <a:ext cx="7632348" cy="5110827"/>
-          </a:xfrm>
-          <a:prstGeom prst="rect">
-            <a:avLst/>
-          </a:prstGeom>
-        </p:spPr>
-      </p:pic>
-      <p:pic>
-        <p:nvPicPr>
-          <p:cNvPr id="11" name="Picture 10">
-            <a:extLst>
-              <a:ext uri="{FF2B5EF4-FFF2-40B4-BE49-F238E27FC236}">
-                <a16:creationId xmlns:a16="http://schemas.microsoft.com/office/drawing/2014/main" id="{7A90447B-243A-4866-A83A-C98E51E9FC81}"/>
-              </a:ext>
-            </a:extLst>
-          </p:cNvPr>
-          <p:cNvPicPr>
-            <a:picLocks noChangeAspect="1"/>
-          </p:cNvPicPr>
-          <p:nvPr/>
-        </p:nvPicPr>
-        <p:blipFill>
-          <a:blip r:embed="rId4"/>
-          <a:stretch>
-            <a:fillRect/>
-          </a:stretch>
-        </p:blipFill>
-        <p:spPr>
-          <a:xfrm>
-            <a:off x="7792026" y="4760046"/>
-            <a:ext cx="4135368" cy="2014847"/>
+            <a:off x="6501284" y="2661611"/>
+            <a:ext cx="5590233" cy="3733934"/>
           </a:xfrm>
           <a:prstGeom prst="rect">
             <a:avLst/>
@@ -5799,7 +5743,7 @@
     </p:spTree>
     <p:extLst>
       <p:ext uri="{BB962C8B-B14F-4D97-AF65-F5344CB8AC3E}">
-        <p14:creationId xmlns:p14="http://schemas.microsoft.com/office/powerpoint/2010/main" val="829181259"/>
+        <p14:creationId xmlns:p14="http://schemas.microsoft.com/office/powerpoint/2010/main" val="344645447"/>
       </p:ext>
     </p:extLst>
   </p:cSld>
@@ -5831,6 +5775,157 @@
           <p:cNvPr id="2" name="Title 1">
             <a:extLst>
               <a:ext uri="{FF2B5EF4-FFF2-40B4-BE49-F238E27FC236}">
+                <a16:creationId xmlns:a16="http://schemas.microsoft.com/office/drawing/2014/main" id="{E340521C-F093-4D3C-AE72-24977A59CF76}"/>
+              </a:ext>
+            </a:extLst>
+          </p:cNvPr>
+          <p:cNvSpPr>
+            <a:spLocks noGrp="1"/>
+          </p:cNvSpPr>
+          <p:nvPr>
+            <p:ph type="title"/>
+          </p:nvPr>
+        </p:nvSpPr>
+        <p:spPr/>
+        <p:txBody>
+          <a:bodyPr>
+            <a:normAutofit/>
+          </a:bodyPr>
+          <a:lstStyle/>
+          <a:p>
+            <a:r>
+              <a:rPr lang="en-GB" b="1" dirty="0"/>
+              <a:t>Linear Regression</a:t>
+            </a:r>
+            <a:endParaRPr lang="en-GB" dirty="0"/>
+          </a:p>
+        </p:txBody>
+      </p:sp>
+      <p:pic>
+        <p:nvPicPr>
+          <p:cNvPr id="5" name="Picture 4">
+            <a:extLst>
+              <a:ext uri="{FF2B5EF4-FFF2-40B4-BE49-F238E27FC236}">
+                <a16:creationId xmlns:a16="http://schemas.microsoft.com/office/drawing/2014/main" id="{DB92D366-EDE5-4ADA-8F0F-C65A0FFA74F2}"/>
+              </a:ext>
+            </a:extLst>
+          </p:cNvPr>
+          <p:cNvPicPr>
+            <a:picLocks noChangeAspect="1"/>
+          </p:cNvPicPr>
+          <p:nvPr/>
+        </p:nvPicPr>
+        <p:blipFill>
+          <a:blip r:embed="rId2"/>
+          <a:stretch>
+            <a:fillRect/>
+          </a:stretch>
+        </p:blipFill>
+        <p:spPr>
+          <a:xfrm>
+            <a:off x="7593827" y="1284718"/>
+            <a:ext cx="4531766" cy="3166702"/>
+          </a:xfrm>
+          <a:prstGeom prst="rect">
+            <a:avLst/>
+          </a:prstGeom>
+        </p:spPr>
+      </p:pic>
+      <p:pic>
+        <p:nvPicPr>
+          <p:cNvPr id="9" name="Picture 8">
+            <a:extLst>
+              <a:ext uri="{FF2B5EF4-FFF2-40B4-BE49-F238E27FC236}">
+                <a16:creationId xmlns:a16="http://schemas.microsoft.com/office/drawing/2014/main" id="{C32A8E7C-CE4D-4701-A54A-CB9E17E740E2}"/>
+              </a:ext>
+            </a:extLst>
+          </p:cNvPr>
+          <p:cNvPicPr>
+            <a:picLocks noChangeAspect="1"/>
+          </p:cNvPicPr>
+          <p:nvPr/>
+        </p:nvPicPr>
+        <p:blipFill>
+          <a:blip r:embed="rId3"/>
+          <a:stretch>
+            <a:fillRect/>
+          </a:stretch>
+        </p:blipFill>
+        <p:spPr>
+          <a:xfrm>
+            <a:off x="0" y="1459653"/>
+            <a:ext cx="7632348" cy="5110827"/>
+          </a:xfrm>
+          <a:prstGeom prst="rect">
+            <a:avLst/>
+          </a:prstGeom>
+        </p:spPr>
+      </p:pic>
+      <p:pic>
+        <p:nvPicPr>
+          <p:cNvPr id="11" name="Picture 10">
+            <a:extLst>
+              <a:ext uri="{FF2B5EF4-FFF2-40B4-BE49-F238E27FC236}">
+                <a16:creationId xmlns:a16="http://schemas.microsoft.com/office/drawing/2014/main" id="{7A90447B-243A-4866-A83A-C98E51E9FC81}"/>
+              </a:ext>
+            </a:extLst>
+          </p:cNvPr>
+          <p:cNvPicPr>
+            <a:picLocks noChangeAspect="1"/>
+          </p:cNvPicPr>
+          <p:nvPr/>
+        </p:nvPicPr>
+        <p:blipFill>
+          <a:blip r:embed="rId4"/>
+          <a:stretch>
+            <a:fillRect/>
+          </a:stretch>
+        </p:blipFill>
+        <p:spPr>
+          <a:xfrm>
+            <a:off x="7792026" y="4760046"/>
+            <a:ext cx="4135368" cy="2014847"/>
+          </a:xfrm>
+          <a:prstGeom prst="rect">
+            <a:avLst/>
+          </a:prstGeom>
+        </p:spPr>
+      </p:pic>
+    </p:spTree>
+    <p:extLst>
+      <p:ext uri="{BB962C8B-B14F-4D97-AF65-F5344CB8AC3E}">
+        <p14:creationId xmlns:p14="http://schemas.microsoft.com/office/powerpoint/2010/main" val="829181259"/>
+      </p:ext>
+    </p:extLst>
+  </p:cSld>
+  <p:clrMapOvr>
+    <a:masterClrMapping/>
+  </p:clrMapOvr>
+</p:sld>
+</file>
+
+<file path=ppt/slides/slide14.xml><?xml version="1.0" encoding="utf-8"?>
+<p:sld xmlns:a="http://schemas.openxmlformats.org/drawingml/2006/main" xmlns:r="http://schemas.openxmlformats.org/officeDocument/2006/relationships" xmlns:p="http://schemas.openxmlformats.org/presentationml/2006/main">
+  <p:cSld>
+    <p:spTree>
+      <p:nvGrpSpPr>
+        <p:cNvPr id="1" name=""/>
+        <p:cNvGrpSpPr/>
+        <p:nvPr/>
+      </p:nvGrpSpPr>
+      <p:grpSpPr>
+        <a:xfrm>
+          <a:off x="0" y="0"/>
+          <a:ext cx="0" cy="0"/>
+          <a:chOff x="0" y="0"/>
+          <a:chExt cx="0" cy="0"/>
+        </a:xfrm>
+      </p:grpSpPr>
+      <p:sp>
+        <p:nvSpPr>
+          <p:cNvPr id="2" name="Title 1">
+            <a:extLst>
+              <a:ext uri="{FF2B5EF4-FFF2-40B4-BE49-F238E27FC236}">
                 <a16:creationId xmlns:a16="http://schemas.microsoft.com/office/drawing/2014/main" id="{13723147-A0C5-4592-9308-81895B4B2CE6}"/>
               </a:ext>
             </a:extLst>
@@ -5960,7 +6055,7 @@
 </p:sld>
 </file>
 
-<file path=ppt/slides/slide14.xml><?xml version="1.0" encoding="utf-8"?>
+<file path=ppt/slides/slide15.xml><?xml version="1.0" encoding="utf-8"?>
 <p:sld xmlns:a="http://schemas.openxmlformats.org/drawingml/2006/main" xmlns:r="http://schemas.openxmlformats.org/officeDocument/2006/relationships" xmlns:p="http://schemas.openxmlformats.org/presentationml/2006/main">
   <p:cSld>
     <p:spTree>
@@ -6070,7 +6165,125 @@
 </p:sld>
 </file>
 
-<file path=ppt/slides/slide15.xml><?xml version="1.0" encoding="utf-8"?>
+<file path=ppt/slides/slide16.xml><?xml version="1.0" encoding="utf-8"?>
+<p:sld xmlns:a="http://schemas.openxmlformats.org/drawingml/2006/main" xmlns:r="http://schemas.openxmlformats.org/officeDocument/2006/relationships" xmlns:p="http://schemas.openxmlformats.org/presentationml/2006/main">
+  <p:cSld>
+    <p:spTree>
+      <p:nvGrpSpPr>
+        <p:cNvPr id="1" name=""/>
+        <p:cNvGrpSpPr/>
+        <p:nvPr/>
+      </p:nvGrpSpPr>
+      <p:grpSpPr>
+        <a:xfrm>
+          <a:off x="0" y="0"/>
+          <a:ext cx="0" cy="0"/>
+          <a:chOff x="0" y="0"/>
+          <a:chExt cx="0" cy="0"/>
+        </a:xfrm>
+      </p:grpSpPr>
+      <p:sp>
+        <p:nvSpPr>
+          <p:cNvPr id="2" name="Title 1">
+            <a:extLst>
+              <a:ext uri="{FF2B5EF4-FFF2-40B4-BE49-F238E27FC236}">
+                <a16:creationId xmlns:a16="http://schemas.microsoft.com/office/drawing/2014/main" id="{3C9EB7D3-B3BC-4863-A4AB-66850F411DBD}"/>
+              </a:ext>
+            </a:extLst>
+          </p:cNvPr>
+          <p:cNvSpPr>
+            <a:spLocks noGrp="1"/>
+          </p:cNvSpPr>
+          <p:nvPr>
+            <p:ph type="title"/>
+          </p:nvPr>
+        </p:nvSpPr>
+        <p:spPr/>
+        <p:txBody>
+          <a:bodyPr/>
+          <a:lstStyle/>
+          <a:p>
+            <a:r>
+              <a:rPr lang="en-GB" dirty="0"/>
+              <a:t>Only no bugs</a:t>
+            </a:r>
+          </a:p>
+        </p:txBody>
+      </p:sp>
+      <p:pic>
+        <p:nvPicPr>
+          <p:cNvPr id="7" name="Picture 6">
+            <a:extLst>
+              <a:ext uri="{FF2B5EF4-FFF2-40B4-BE49-F238E27FC236}">
+                <a16:creationId xmlns:a16="http://schemas.microsoft.com/office/drawing/2014/main" id="{03960079-11EC-4905-A151-BC2941BD88FB}"/>
+              </a:ext>
+            </a:extLst>
+          </p:cNvPr>
+          <p:cNvPicPr>
+            <a:picLocks noChangeAspect="1"/>
+          </p:cNvPicPr>
+          <p:nvPr/>
+        </p:nvPicPr>
+        <p:blipFill>
+          <a:blip r:embed="rId2"/>
+          <a:stretch>
+            <a:fillRect/>
+          </a:stretch>
+        </p:blipFill>
+        <p:spPr>
+          <a:xfrm>
+            <a:off x="160511" y="1284718"/>
+            <a:ext cx="3952875" cy="1390650"/>
+          </a:xfrm>
+          <a:prstGeom prst="rect">
+            <a:avLst/>
+          </a:prstGeom>
+        </p:spPr>
+      </p:pic>
+      <p:pic>
+        <p:nvPicPr>
+          <p:cNvPr id="11" name="Picture 10">
+            <a:extLst>
+              <a:ext uri="{FF2B5EF4-FFF2-40B4-BE49-F238E27FC236}">
+                <a16:creationId xmlns:a16="http://schemas.microsoft.com/office/drawing/2014/main" id="{10885FE1-FCD4-4CF7-B762-5EC0C3453B9A}"/>
+              </a:ext>
+            </a:extLst>
+          </p:cNvPr>
+          <p:cNvPicPr>
+            <a:picLocks noChangeAspect="1"/>
+          </p:cNvPicPr>
+          <p:nvPr/>
+        </p:nvPicPr>
+        <p:blipFill>
+          <a:blip r:embed="rId3"/>
+          <a:stretch>
+            <a:fillRect/>
+          </a:stretch>
+        </p:blipFill>
+        <p:spPr>
+          <a:xfrm>
+            <a:off x="0" y="3004823"/>
+            <a:ext cx="11818224" cy="2692592"/>
+          </a:xfrm>
+          <a:prstGeom prst="rect">
+            <a:avLst/>
+          </a:prstGeom>
+        </p:spPr>
+      </p:pic>
+    </p:spTree>
+    <p:extLst>
+      <p:ext uri="{BB962C8B-B14F-4D97-AF65-F5344CB8AC3E}">
+        <p14:creationId xmlns:p14="http://schemas.microsoft.com/office/powerpoint/2010/main" val="1415209114"/>
+      </p:ext>
+    </p:extLst>
+  </p:cSld>
+  <p:clrMapOvr>
+    <a:masterClrMapping/>
+  </p:clrMapOvr>
+</p:sld>
+</file>
+
+<file path=ppt/slides/slide17.xml><?xml version="1.0" encoding="utf-8"?>
 <p:sld xmlns:a="http://schemas.openxmlformats.org/drawingml/2006/main" xmlns:r="http://schemas.openxmlformats.org/officeDocument/2006/relationships" xmlns:p="http://schemas.openxmlformats.org/presentationml/2006/main">
   <p:cSld>
     <p:spTree>
@@ -6208,7 +6421,7 @@
 </p:sld>
 </file>
 
-<file path=ppt/slides/slide16.xml><?xml version="1.0" encoding="utf-8"?>
+<file path=ppt/slides/slide18.xml><?xml version="1.0" encoding="utf-8"?>
 <p:sld xmlns:a="http://schemas.openxmlformats.org/drawingml/2006/main" xmlns:r="http://schemas.openxmlformats.org/officeDocument/2006/relationships" xmlns:p="http://schemas.openxmlformats.org/presentationml/2006/main">
   <p:cSld>
     <p:spTree>
@@ -6346,7 +6559,7 @@
 </p:sld>
 </file>
 
-<file path=ppt/slides/slide17.xml><?xml version="1.0" encoding="utf-8"?>
+<file path=ppt/slides/slide19.xml><?xml version="1.0" encoding="utf-8"?>
 <p:sld xmlns:a="http://schemas.openxmlformats.org/drawingml/2006/main" xmlns:r="http://schemas.openxmlformats.org/officeDocument/2006/relationships" xmlns:p="http://schemas.openxmlformats.org/presentationml/2006/main">
   <p:cSld>
     <p:spTree>
@@ -6491,7 +6704,233 @@
 </p:sld>
 </file>
 
-<file path=ppt/slides/slide18.xml><?xml version="1.0" encoding="utf-8"?>
+<file path=ppt/slides/slide2.xml><?xml version="1.0" encoding="utf-8"?>
+<p:sld xmlns:a="http://schemas.openxmlformats.org/drawingml/2006/main" xmlns:r="http://schemas.openxmlformats.org/officeDocument/2006/relationships" xmlns:p="http://schemas.openxmlformats.org/presentationml/2006/main" show="0">
+  <p:cSld>
+    <p:spTree>
+      <p:nvGrpSpPr>
+        <p:cNvPr id="1" name=""/>
+        <p:cNvGrpSpPr/>
+        <p:nvPr/>
+      </p:nvGrpSpPr>
+      <p:grpSpPr>
+        <a:xfrm>
+          <a:off x="0" y="0"/>
+          <a:ext cx="0" cy="0"/>
+          <a:chOff x="0" y="0"/>
+          <a:chExt cx="0" cy="0"/>
+        </a:xfrm>
+      </p:grpSpPr>
+      <p:sp>
+        <p:nvSpPr>
+          <p:cNvPr id="2" name="Title 1">
+            <a:extLst>
+              <a:ext uri="{FF2B5EF4-FFF2-40B4-BE49-F238E27FC236}">
+                <a16:creationId xmlns:a16="http://schemas.microsoft.com/office/drawing/2014/main" id="{326B76E6-8E55-4532-B4C9-362459A30A05}"/>
+              </a:ext>
+            </a:extLst>
+          </p:cNvPr>
+          <p:cNvSpPr>
+            <a:spLocks noGrp="1"/>
+          </p:cNvSpPr>
+          <p:nvPr>
+            <p:ph type="title"/>
+          </p:nvPr>
+        </p:nvSpPr>
+        <p:spPr/>
+        <p:txBody>
+          <a:bodyPr/>
+          <a:lstStyle/>
+          <a:p>
+            <a:r>
+              <a:rPr lang="en-GB" dirty="0"/>
+              <a:t>Requirements</a:t>
+            </a:r>
+            <a:endParaRPr lang="en-GB" b="1" dirty="0"/>
+          </a:p>
+        </p:txBody>
+      </p:sp>
+      <p:sp>
+        <p:nvSpPr>
+          <p:cNvPr id="21" name="Content Placeholder 2"/>
+          <p:cNvSpPr txBox="1">
+            <a:spLocks/>
+          </p:cNvSpPr>
+          <p:nvPr/>
+        </p:nvSpPr>
+        <p:spPr>
+          <a:xfrm>
+            <a:off x="850250" y="1515840"/>
+            <a:ext cx="10465450" cy="4360958"/>
+          </a:xfrm>
+          <a:prstGeom prst="rect">
+            <a:avLst/>
+          </a:prstGeom>
+          <a:ln w="57150">
+            <a:noFill/>
+          </a:ln>
+        </p:spPr>
+        <p:txBody>
+          <a:bodyPr vert="horz" lIns="91440" tIns="45720" rIns="91440" bIns="45720" numCol="1" rtlCol="0" anchor="t">
+            <a:normAutofit/>
+          </a:bodyPr>
+          <a:lstStyle/>
+          <a:p>
+            <a:pPr rtl="0">
+              <a:buFont typeface="+mj-lt"/>
+              <a:buAutoNum type="arabicPeriod"/>
+            </a:pPr>
+            <a:r>
+              <a:rPr lang="en-GB" sz="1400" dirty="0"/>
+              <a:t>Selection of the dataset from the e-learning pages: ant-1.7.csv</a:t>
+            </a:r>
+          </a:p>
+          <a:p>
+            <a:pPr rtl="0">
+              <a:buFont typeface="+mj-lt"/>
+              <a:buAutoNum type="arabicPeriod"/>
+            </a:pPr>
+            <a:endParaRPr lang="en-GB" sz="1400" dirty="0"/>
+          </a:p>
+          <a:p>
+            <a:pPr rtl="0">
+              <a:buFont typeface="+mj-lt"/>
+              <a:buAutoNum type="arabicPeriod"/>
+            </a:pPr>
+            <a:r>
+              <a:rPr lang="en-GB" sz="1400" dirty="0"/>
+              <a:t>Selection of the dependent variable: software faultiness, i.e., the presence of at least one fault in a module</a:t>
+            </a:r>
+          </a:p>
+          <a:p>
+            <a:pPr rtl="0">
+              <a:buFont typeface="+mj-lt"/>
+              <a:buAutoNum type="arabicPeriod"/>
+            </a:pPr>
+            <a:endParaRPr lang="en-GB" sz="1400" dirty="0"/>
+          </a:p>
+          <a:p>
+            <a:pPr rtl="0">
+              <a:buFont typeface="+mj-lt"/>
+              <a:buAutoNum type="arabicPeriod"/>
+            </a:pPr>
+            <a:r>
+              <a:rPr lang="en-GB" sz="1400" dirty="0"/>
+              <a:t>Selection of the independent variables: select four variables in the dataset</a:t>
+            </a:r>
+          </a:p>
+          <a:p>
+            <a:pPr rtl="0">
+              <a:buFont typeface="+mj-lt"/>
+              <a:buAutoNum type="arabicPeriod"/>
+            </a:pPr>
+            <a:endParaRPr lang="en-GB" sz="1400" dirty="0"/>
+          </a:p>
+          <a:p>
+            <a:pPr rtl="0">
+              <a:buFont typeface="+mj-lt"/>
+              <a:buAutoNum type="arabicPeriod"/>
+            </a:pPr>
+            <a:r>
+              <a:rPr lang="en-GB" sz="1400" dirty="0"/>
+              <a:t>Visualization of the dataset via diagrams for single variables (e.g., histograms, pie charts) and diagrams for pairs of variables (e.g., scatterplots)</a:t>
+            </a:r>
+          </a:p>
+          <a:p>
+            <a:pPr rtl="0">
+              <a:buFont typeface="+mj-lt"/>
+              <a:buAutoNum type="arabicPeriod"/>
+            </a:pPr>
+            <a:endParaRPr lang="en-GB" sz="1400" dirty="0"/>
+          </a:p>
+          <a:p>
+            <a:pPr rtl="0">
+              <a:buFont typeface="+mj-lt"/>
+              <a:buAutoNum type="arabicPeriod"/>
+            </a:pPr>
+            <a:r>
+              <a:rPr lang="en-GB" sz="1400" dirty="0"/>
+              <a:t>Computation of descriptive statistics for the dependent and the independent variables</a:t>
+            </a:r>
+          </a:p>
+          <a:p>
+            <a:pPr rtl="0">
+              <a:buFont typeface="+mj-lt"/>
+              <a:buAutoNum type="arabicPeriod"/>
+            </a:pPr>
+            <a:endParaRPr lang="en-GB" sz="1400" dirty="0"/>
+          </a:p>
+          <a:p>
+            <a:pPr rtl="0">
+              <a:buFont typeface="+mj-lt"/>
+              <a:buAutoNum type="arabicPeriod"/>
+            </a:pPr>
+            <a:r>
+              <a:rPr lang="en-GB" sz="1400" dirty="0"/>
+              <a:t>Selection of one or more data analysis techniques</a:t>
+            </a:r>
+          </a:p>
+          <a:p>
+            <a:pPr rtl="0">
+              <a:buFont typeface="+mj-lt"/>
+              <a:buAutoNum type="arabicPeriod"/>
+            </a:pPr>
+            <a:endParaRPr lang="en-GB" sz="1400" dirty="0"/>
+          </a:p>
+          <a:p>
+            <a:pPr rtl="0">
+              <a:buFont typeface="+mj-lt"/>
+              <a:buAutoNum type="arabicPeriod"/>
+            </a:pPr>
+            <a:r>
+              <a:rPr lang="en-GB" sz="1400" dirty="0"/>
+              <a:t>Building of a set of univariate and multivariate statistically significant models. </a:t>
+            </a:r>
+          </a:p>
+          <a:p>
+            <a:pPr lvl="1"/>
+            <a:r>
+              <a:rPr lang="en-GB" sz="1400" dirty="0"/>
+              <a:t>a. Make sure that their assumptions are satisfied, otherwise carry out outlier analysis and removal</a:t>
+            </a:r>
+          </a:p>
+          <a:p>
+            <a:pPr lvl="1"/>
+            <a:r>
+              <a:rPr lang="en-GB" sz="1400" dirty="0"/>
+              <a:t>b. Whenever possible, use both parametric (e.g., Pearson's correlation coefficient) and nonparametric (e.g., Spearman's rho, Kendall's tau) techniques</a:t>
+            </a:r>
+          </a:p>
+          <a:p>
+            <a:pPr lvl="1"/>
+            <a:endParaRPr lang="en-GB" sz="1400" dirty="0"/>
+          </a:p>
+          <a:p>
+            <a:pPr rtl="0">
+              <a:buFont typeface="+mj-lt"/>
+              <a:buAutoNum type="arabicPeriod" startAt="8"/>
+            </a:pPr>
+            <a:r>
+              <a:rPr lang="en-GB" sz="1400" dirty="0"/>
+              <a:t>Description of the results obtained and the limitation to their use (e.g., threats to validity)</a:t>
+            </a:r>
+          </a:p>
+        </p:txBody>
+      </p:sp>
+    </p:spTree>
+    <p:extLst>
+      <p:ext uri="{BB962C8B-B14F-4D97-AF65-F5344CB8AC3E}">
+        <p14:creationId xmlns:p14="http://schemas.microsoft.com/office/powerpoint/2010/main" val="3748667521"/>
+      </p:ext>
+    </p:extLst>
+  </p:cSld>
+  <p:clrMapOvr>
+    <a:masterClrMapping/>
+  </p:clrMapOvr>
+</p:sld>
+</file>
+
+<file path=ppt/slides/slide20.xml><?xml version="1.0" encoding="utf-8"?>
 <p:sld xmlns:a="http://schemas.openxmlformats.org/drawingml/2006/main" xmlns:r="http://schemas.openxmlformats.org/officeDocument/2006/relationships" xmlns:p="http://schemas.openxmlformats.org/presentationml/2006/main">
   <p:cSld>
     <p:spTree>
@@ -6629,7 +7068,7 @@
 </p:sld>
 </file>
 
-<file path=ppt/slides/slide19.xml><?xml version="1.0" encoding="utf-8"?>
+<file path=ppt/slides/slide21.xml><?xml version="1.0" encoding="utf-8"?>
 <p:sld xmlns:a="http://schemas.openxmlformats.org/drawingml/2006/main" xmlns:r="http://schemas.openxmlformats.org/officeDocument/2006/relationships" xmlns:p="http://schemas.openxmlformats.org/presentationml/2006/main">
   <p:cSld>
     <p:spTree>
@@ -6727,232 +7166,6 @@
     <p:extLst>
       <p:ext uri="{BB962C8B-B14F-4D97-AF65-F5344CB8AC3E}">
         <p14:creationId xmlns:p14="http://schemas.microsoft.com/office/powerpoint/2010/main" val="321941757"/>
-      </p:ext>
-    </p:extLst>
-  </p:cSld>
-  <p:clrMapOvr>
-    <a:masterClrMapping/>
-  </p:clrMapOvr>
-</p:sld>
-</file>
-
-<file path=ppt/slides/slide2.xml><?xml version="1.0" encoding="utf-8"?>
-<p:sld xmlns:a="http://schemas.openxmlformats.org/drawingml/2006/main" xmlns:r="http://schemas.openxmlformats.org/officeDocument/2006/relationships" xmlns:p="http://schemas.openxmlformats.org/presentationml/2006/main" show="0">
-  <p:cSld>
-    <p:spTree>
-      <p:nvGrpSpPr>
-        <p:cNvPr id="1" name=""/>
-        <p:cNvGrpSpPr/>
-        <p:nvPr/>
-      </p:nvGrpSpPr>
-      <p:grpSpPr>
-        <a:xfrm>
-          <a:off x="0" y="0"/>
-          <a:ext cx="0" cy="0"/>
-          <a:chOff x="0" y="0"/>
-          <a:chExt cx="0" cy="0"/>
-        </a:xfrm>
-      </p:grpSpPr>
-      <p:sp>
-        <p:nvSpPr>
-          <p:cNvPr id="2" name="Title 1">
-            <a:extLst>
-              <a:ext uri="{FF2B5EF4-FFF2-40B4-BE49-F238E27FC236}">
-                <a16:creationId xmlns:a16="http://schemas.microsoft.com/office/drawing/2014/main" id="{326B76E6-8E55-4532-B4C9-362459A30A05}"/>
-              </a:ext>
-            </a:extLst>
-          </p:cNvPr>
-          <p:cNvSpPr>
-            <a:spLocks noGrp="1"/>
-          </p:cNvSpPr>
-          <p:nvPr>
-            <p:ph type="title"/>
-          </p:nvPr>
-        </p:nvSpPr>
-        <p:spPr/>
-        <p:txBody>
-          <a:bodyPr/>
-          <a:lstStyle/>
-          <a:p>
-            <a:r>
-              <a:rPr lang="en-GB" dirty="0"/>
-              <a:t>Requirements</a:t>
-            </a:r>
-            <a:endParaRPr lang="en-GB" b="1" dirty="0"/>
-          </a:p>
-        </p:txBody>
-      </p:sp>
-      <p:sp>
-        <p:nvSpPr>
-          <p:cNvPr id="21" name="Content Placeholder 2"/>
-          <p:cNvSpPr txBox="1">
-            <a:spLocks/>
-          </p:cNvSpPr>
-          <p:nvPr/>
-        </p:nvSpPr>
-        <p:spPr>
-          <a:xfrm>
-            <a:off x="850250" y="1515840"/>
-            <a:ext cx="10465450" cy="4360958"/>
-          </a:xfrm>
-          <a:prstGeom prst="rect">
-            <a:avLst/>
-          </a:prstGeom>
-          <a:ln w="57150">
-            <a:noFill/>
-          </a:ln>
-        </p:spPr>
-        <p:txBody>
-          <a:bodyPr vert="horz" lIns="91440" tIns="45720" rIns="91440" bIns="45720" numCol="1" rtlCol="0" anchor="t">
-            <a:normAutofit/>
-          </a:bodyPr>
-          <a:lstStyle/>
-          <a:p>
-            <a:pPr rtl="0">
-              <a:buFont typeface="+mj-lt"/>
-              <a:buAutoNum type="arabicPeriod"/>
-            </a:pPr>
-            <a:r>
-              <a:rPr lang="en-GB" sz="1400" dirty="0"/>
-              <a:t>Selection of the dataset from the e-learning pages: ant-1.7.csv</a:t>
-            </a:r>
-          </a:p>
-          <a:p>
-            <a:pPr rtl="0">
-              <a:buFont typeface="+mj-lt"/>
-              <a:buAutoNum type="arabicPeriod"/>
-            </a:pPr>
-            <a:endParaRPr lang="en-GB" sz="1400" dirty="0"/>
-          </a:p>
-          <a:p>
-            <a:pPr rtl="0">
-              <a:buFont typeface="+mj-lt"/>
-              <a:buAutoNum type="arabicPeriod"/>
-            </a:pPr>
-            <a:r>
-              <a:rPr lang="en-GB" sz="1400" dirty="0"/>
-              <a:t>Selection of the dependent variable: software faultiness, i.e., the presence of at least one fault in a module</a:t>
-            </a:r>
-          </a:p>
-          <a:p>
-            <a:pPr rtl="0">
-              <a:buFont typeface="+mj-lt"/>
-              <a:buAutoNum type="arabicPeriod"/>
-            </a:pPr>
-            <a:endParaRPr lang="en-GB" sz="1400" dirty="0"/>
-          </a:p>
-          <a:p>
-            <a:pPr rtl="0">
-              <a:buFont typeface="+mj-lt"/>
-              <a:buAutoNum type="arabicPeriod"/>
-            </a:pPr>
-            <a:r>
-              <a:rPr lang="en-GB" sz="1400" dirty="0"/>
-              <a:t>Selection of the independent variables: select four variables in the dataset</a:t>
-            </a:r>
-          </a:p>
-          <a:p>
-            <a:pPr rtl="0">
-              <a:buFont typeface="+mj-lt"/>
-              <a:buAutoNum type="arabicPeriod"/>
-            </a:pPr>
-            <a:endParaRPr lang="en-GB" sz="1400" dirty="0"/>
-          </a:p>
-          <a:p>
-            <a:pPr rtl="0">
-              <a:buFont typeface="+mj-lt"/>
-              <a:buAutoNum type="arabicPeriod"/>
-            </a:pPr>
-            <a:r>
-              <a:rPr lang="en-GB" sz="1400" dirty="0"/>
-              <a:t>Visualization of the dataset via diagrams for single variables (e.g., histograms, pie charts) and diagrams for pairs of variables (e.g., scatterplots)</a:t>
-            </a:r>
-          </a:p>
-          <a:p>
-            <a:pPr rtl="0">
-              <a:buFont typeface="+mj-lt"/>
-              <a:buAutoNum type="arabicPeriod"/>
-            </a:pPr>
-            <a:endParaRPr lang="en-GB" sz="1400" dirty="0"/>
-          </a:p>
-          <a:p>
-            <a:pPr rtl="0">
-              <a:buFont typeface="+mj-lt"/>
-              <a:buAutoNum type="arabicPeriod"/>
-            </a:pPr>
-            <a:r>
-              <a:rPr lang="en-GB" sz="1400" dirty="0"/>
-              <a:t>Computation of descriptive statistics for the dependent and the independent variables</a:t>
-            </a:r>
-          </a:p>
-          <a:p>
-            <a:pPr rtl="0">
-              <a:buFont typeface="+mj-lt"/>
-              <a:buAutoNum type="arabicPeriod"/>
-            </a:pPr>
-            <a:endParaRPr lang="en-GB" sz="1400" dirty="0"/>
-          </a:p>
-          <a:p>
-            <a:pPr rtl="0">
-              <a:buFont typeface="+mj-lt"/>
-              <a:buAutoNum type="arabicPeriod"/>
-            </a:pPr>
-            <a:r>
-              <a:rPr lang="en-GB" sz="1400" dirty="0"/>
-              <a:t>Selection of one or more data analysis techniques</a:t>
-            </a:r>
-          </a:p>
-          <a:p>
-            <a:pPr rtl="0">
-              <a:buFont typeface="+mj-lt"/>
-              <a:buAutoNum type="arabicPeriod"/>
-            </a:pPr>
-            <a:endParaRPr lang="en-GB" sz="1400" dirty="0"/>
-          </a:p>
-          <a:p>
-            <a:pPr rtl="0">
-              <a:buFont typeface="+mj-lt"/>
-              <a:buAutoNum type="arabicPeriod"/>
-            </a:pPr>
-            <a:r>
-              <a:rPr lang="en-GB" sz="1400" dirty="0"/>
-              <a:t>Building of a set of univariate and multivariate statistically significant models. </a:t>
-            </a:r>
-          </a:p>
-          <a:p>
-            <a:pPr lvl="1"/>
-            <a:r>
-              <a:rPr lang="en-GB" sz="1400" dirty="0"/>
-              <a:t>a. Make sure that their assumptions are satisfied, otherwise carry out outlier analysis and removal</a:t>
-            </a:r>
-          </a:p>
-          <a:p>
-            <a:pPr lvl="1"/>
-            <a:r>
-              <a:rPr lang="en-GB" sz="1400" dirty="0"/>
-              <a:t>b. Whenever possible, use both parametric (e.g., Pearson's correlation coefficient) and nonparametric (e.g., Spearman's rho, Kendall's tau) techniques</a:t>
-            </a:r>
-          </a:p>
-          <a:p>
-            <a:pPr lvl="1"/>
-            <a:endParaRPr lang="en-GB" sz="1400" dirty="0"/>
-          </a:p>
-          <a:p>
-            <a:pPr rtl="0">
-              <a:buFont typeface="+mj-lt"/>
-              <a:buAutoNum type="arabicPeriod" startAt="8"/>
-            </a:pPr>
-            <a:r>
-              <a:rPr lang="en-GB" sz="1400" dirty="0"/>
-              <a:t>Description of the results obtained and the limitation to their use (e.g., threats to validity)</a:t>
-            </a:r>
-          </a:p>
-        </p:txBody>
-      </p:sp>
-    </p:spTree>
-    <p:extLst>
-      <p:ext uri="{BB962C8B-B14F-4D97-AF65-F5344CB8AC3E}">
-        <p14:creationId xmlns:p14="http://schemas.microsoft.com/office/powerpoint/2010/main" val="3748667521"/>
       </p:ext>
     </p:extLst>
   </p:cSld>
@@ -7269,7 +7482,12 @@
             <p:ph type="title"/>
           </p:nvPr>
         </p:nvSpPr>
-        <p:spPr/>
+        <p:spPr>
+          <a:xfrm>
+            <a:off x="834260" y="462455"/>
+            <a:ext cx="5981210" cy="822263"/>
+          </a:xfrm>
+        </p:spPr>
         <p:txBody>
           <a:bodyPr/>
           <a:lstStyle/>
@@ -7303,7 +7521,7 @@
         </p:blipFill>
         <p:spPr>
           <a:xfrm>
-            <a:off x="743825" y="1429639"/>
+            <a:off x="0" y="1432560"/>
             <a:ext cx="6191250" cy="4581525"/>
           </a:xfrm>
           <a:prstGeom prst="rect">
@@ -7311,6 +7529,147 @@
           </a:prstGeom>
         </p:spPr>
       </p:pic>
+      <p:sp>
+        <p:nvSpPr>
+          <p:cNvPr id="7" name="TextBox 6">
+            <a:extLst>
+              <a:ext uri="{FF2B5EF4-FFF2-40B4-BE49-F238E27FC236}">
+                <a16:creationId xmlns:a16="http://schemas.microsoft.com/office/drawing/2014/main" id="{ABF2D72B-B3B3-4EE7-A4A3-A06919BAA59E}"/>
+              </a:ext>
+            </a:extLst>
+          </p:cNvPr>
+          <p:cNvSpPr txBox="1"/>
+          <p:nvPr/>
+        </p:nvSpPr>
+        <p:spPr>
+          <a:xfrm>
+            <a:off x="6509784" y="5552420"/>
+            <a:ext cx="4872370" cy="923330"/>
+          </a:xfrm>
+          <a:prstGeom prst="rect">
+            <a:avLst/>
+          </a:prstGeom>
+          <a:noFill/>
+        </p:spPr>
+        <p:txBody>
+          <a:bodyPr wrap="square">
+            <a:spAutoFit/>
+          </a:bodyPr>
+          <a:lstStyle/>
+          <a:p>
+            <a:r>
+              <a:rPr lang="en-GB" dirty="0"/>
+              <a:t>Weighted Methods per Class (WMC) sum of the complexities of the methods of the class Type: ordinal</a:t>
+            </a:r>
+          </a:p>
+        </p:txBody>
+      </p:sp>
+      <p:sp>
+        <p:nvSpPr>
+          <p:cNvPr id="9" name="TextBox 8">
+            <a:extLst>
+              <a:ext uri="{FF2B5EF4-FFF2-40B4-BE49-F238E27FC236}">
+                <a16:creationId xmlns:a16="http://schemas.microsoft.com/office/drawing/2014/main" id="{40A8B18C-6DF0-423B-A8F4-668D8589F929}"/>
+              </a:ext>
+            </a:extLst>
+          </p:cNvPr>
+          <p:cNvSpPr txBox="1"/>
+          <p:nvPr/>
+        </p:nvSpPr>
+        <p:spPr>
+          <a:xfrm>
+            <a:off x="6509784" y="4122360"/>
+            <a:ext cx="5265774" cy="1200329"/>
+          </a:xfrm>
+          <a:prstGeom prst="rect">
+            <a:avLst/>
+          </a:prstGeom>
+          <a:noFill/>
+        </p:spPr>
+        <p:txBody>
+          <a:bodyPr wrap="square">
+            <a:spAutoFit/>
+          </a:bodyPr>
+          <a:lstStyle/>
+          <a:p>
+            <a:r>
+              <a:rPr lang="en-GB" dirty="0"/>
+              <a:t>Source lines of code (LOC) is a software metric used to measure the size of a computer program by counting the number of lines in the text of the program's source code Type: ordinal</a:t>
+            </a:r>
+          </a:p>
+        </p:txBody>
+      </p:sp>
+      <p:sp>
+        <p:nvSpPr>
+          <p:cNvPr id="11" name="TextBox 10">
+            <a:extLst>
+              <a:ext uri="{FF2B5EF4-FFF2-40B4-BE49-F238E27FC236}">
+                <a16:creationId xmlns:a16="http://schemas.microsoft.com/office/drawing/2014/main" id="{37C16F95-B968-4037-8B1D-15D3E38FF062}"/>
+              </a:ext>
+            </a:extLst>
+          </p:cNvPr>
+          <p:cNvSpPr txBox="1"/>
+          <p:nvPr/>
+        </p:nvSpPr>
+        <p:spPr>
+          <a:xfrm>
+            <a:off x="6509784" y="1432560"/>
+            <a:ext cx="5085020" cy="1200329"/>
+          </a:xfrm>
+          <a:prstGeom prst="rect">
+            <a:avLst/>
+          </a:prstGeom>
+          <a:noFill/>
+        </p:spPr>
+        <p:txBody>
+          <a:bodyPr wrap="square">
+            <a:spAutoFit/>
+          </a:bodyPr>
+          <a:lstStyle/>
+          <a:p>
+            <a:r>
+              <a:rPr lang="en-GB" dirty="0"/>
+              <a:t>Response For a Class (RFC) cardinality of the set of methods that can potentially be executed in response to a message received by an object of the class</a:t>
+            </a:r>
+          </a:p>
+        </p:txBody>
+      </p:sp>
+      <p:sp>
+        <p:nvSpPr>
+          <p:cNvPr id="13" name="TextBox 12">
+            <a:extLst>
+              <a:ext uri="{FF2B5EF4-FFF2-40B4-BE49-F238E27FC236}">
+                <a16:creationId xmlns:a16="http://schemas.microsoft.com/office/drawing/2014/main" id="{033040E4-A2F7-4C93-9953-440CCECDA300}"/>
+              </a:ext>
+            </a:extLst>
+          </p:cNvPr>
+          <p:cNvSpPr txBox="1"/>
+          <p:nvPr/>
+        </p:nvSpPr>
+        <p:spPr>
+          <a:xfrm>
+            <a:off x="6509784" y="2692300"/>
+            <a:ext cx="5265774" cy="1200329"/>
+          </a:xfrm>
+          <a:prstGeom prst="rect">
+            <a:avLst/>
+          </a:prstGeom>
+          <a:noFill/>
+        </p:spPr>
+        <p:txBody>
+          <a:bodyPr wrap="square">
+            <a:spAutoFit/>
+          </a:bodyPr>
+          <a:lstStyle/>
+          <a:p>
+            <a:pPr rtl="0"/>
+            <a:r>
+              <a:rPr lang="en-GB" dirty="0"/>
+              <a:t>EF -&gt; measures the number of data types a class knows about. This includes inheritance, interface implementation, parameter types, variable types, and exceptions. Type: ordinal</a:t>
+            </a:r>
+          </a:p>
+        </p:txBody>
+      </p:sp>
     </p:spTree>
     <p:extLst>
       <p:ext uri="{BB962C8B-B14F-4D97-AF65-F5344CB8AC3E}">
@@ -7496,10 +7855,10 @@
       </p:sp>
       <p:pic>
         <p:nvPicPr>
-          <p:cNvPr id="5" name="Picture 4">
+          <p:cNvPr id="7" name="Picture 6">
             <a:extLst>
               <a:ext uri="{FF2B5EF4-FFF2-40B4-BE49-F238E27FC236}">
-                <a16:creationId xmlns:a16="http://schemas.microsoft.com/office/drawing/2014/main" id="{078C5E64-6BB0-4266-9088-19F7078C9043}"/>
+                <a16:creationId xmlns:a16="http://schemas.microsoft.com/office/drawing/2014/main" id="{C63BBE2B-6C11-4605-982E-332ED414A831}"/>
               </a:ext>
             </a:extLst>
           </p:cNvPr>
@@ -7516,8 +7875,8 @@
         </p:blipFill>
         <p:spPr>
           <a:xfrm>
-            <a:off x="97030" y="1768196"/>
-            <a:ext cx="5960949" cy="4009607"/>
+            <a:off x="6134023" y="1828800"/>
+            <a:ext cx="5848350" cy="3200400"/>
           </a:xfrm>
           <a:prstGeom prst="rect">
             <a:avLst/>
@@ -7526,34 +7885,104 @@
       </p:pic>
       <p:pic>
         <p:nvPicPr>
-          <p:cNvPr id="7" name="Picture 6">
+          <p:cNvPr id="8194" name="Picture 2">
             <a:extLst>
               <a:ext uri="{FF2B5EF4-FFF2-40B4-BE49-F238E27FC236}">
-                <a16:creationId xmlns:a16="http://schemas.microsoft.com/office/drawing/2014/main" id="{C63BBE2B-6C11-4605-982E-332ED414A831}"/>
+                <a16:creationId xmlns:a16="http://schemas.microsoft.com/office/drawing/2014/main" id="{E9A4D176-6479-4544-94F2-74EFB2443BDF}"/>
               </a:ext>
             </a:extLst>
           </p:cNvPr>
           <p:cNvPicPr>
-            <a:picLocks noChangeAspect="1"/>
+            <a:picLocks noChangeAspect="1" noChangeArrowheads="1"/>
           </p:cNvPicPr>
           <p:nvPr/>
         </p:nvPicPr>
         <p:blipFill>
-          <a:blip r:embed="rId3"/>
+          <a:blip r:embed="rId3">
+            <a:extLst>
+              <a:ext uri="{28A0092B-C50C-407E-A947-70E740481C1C}">
+                <a14:useLocalDpi xmlns:a14="http://schemas.microsoft.com/office/drawing/2010/main" val="0"/>
+              </a:ext>
+            </a:extLst>
+          </a:blip>
+          <a:srcRect/>
           <a:stretch>
             <a:fillRect/>
           </a:stretch>
         </p:blipFill>
-        <p:spPr>
-          <a:xfrm>
-            <a:off x="6134023" y="1828800"/>
-            <a:ext cx="5848350" cy="3200400"/>
+        <p:spPr bwMode="auto">
+          <a:xfrm>
+            <a:off x="522761" y="1710976"/>
+            <a:ext cx="5223718" cy="3677497"/>
           </a:xfrm>
           <a:prstGeom prst="rect">
             <a:avLst/>
           </a:prstGeom>
+          <a:noFill/>
+          <a:extLst>
+            <a:ext uri="{909E8E84-426E-40DD-AFC4-6F175D3DCCD1}">
+              <a14:hiddenFill xmlns:a14="http://schemas.microsoft.com/office/drawing/2010/main">
+                <a:solidFill>
+                  <a:srgbClr val="FFFFFF"/>
+                </a:solidFill>
+              </a14:hiddenFill>
+            </a:ext>
+          </a:extLst>
         </p:spPr>
       </p:pic>
+      <p:sp>
+        <p:nvSpPr>
+          <p:cNvPr id="10" name="TextBox 9">
+            <a:extLst>
+              <a:ext uri="{FF2B5EF4-FFF2-40B4-BE49-F238E27FC236}">
+                <a16:creationId xmlns:a16="http://schemas.microsoft.com/office/drawing/2014/main" id="{1838F555-EC3B-4E45-9B98-9F1716EDA387}"/>
+              </a:ext>
+            </a:extLst>
+          </p:cNvPr>
+          <p:cNvSpPr txBox="1"/>
+          <p:nvPr/>
+        </p:nvSpPr>
+        <p:spPr>
+          <a:xfrm>
+            <a:off x="39699" y="6072379"/>
+            <a:ext cx="6094324" cy="646331"/>
+          </a:xfrm>
+          <a:prstGeom prst="rect">
+            <a:avLst/>
+          </a:prstGeom>
+          <a:noFill/>
+        </p:spPr>
+        <p:txBody>
+          <a:bodyPr wrap="square">
+            <a:spAutoFit/>
+          </a:bodyPr>
+          <a:lstStyle/>
+          <a:p>
+            <a:r>
+              <a:rPr lang="en-GB" dirty="0"/>
+              <a:t>A </a:t>
+            </a:r>
+            <a:r>
+              <a:rPr lang="en-GB" b="1" dirty="0"/>
+              <a:t>histogram</a:t>
+            </a:r>
+            <a:r>
+              <a:rPr lang="en-GB" dirty="0"/>
+              <a:t> is an approximate representation of the </a:t>
+            </a:r>
+            <a:r>
+              <a:rPr lang="en-GB" dirty="0">
+                <a:hlinkClick r:id="rId4" tooltip="Frequency distribution"/>
+              </a:rPr>
+              <a:t>distribution</a:t>
+            </a:r>
+            <a:r>
+              <a:rPr lang="en-GB" dirty="0"/>
+              <a:t> of numerical data.</a:t>
+            </a:r>
+          </a:p>
+        </p:txBody>
+      </p:sp>
     </p:spTree>
     <p:extLst>
       <p:ext uri="{BB962C8B-B14F-4D97-AF65-F5344CB8AC3E}">

</xml_diff>